<commit_message>
added data for SCI
</commit_message>
<xml_diff>
--- a/docs/graphs.pptx
+++ b/docs/graphs.pptx
@@ -5,7 +5,7 @@
     <p:sldMasterId id="2147483648" r:id="rId1"/>
   </p:sldMasterIdLst>
   <p:notesMasterIdLst>
-    <p:notesMasterId r:id="rId9"/>
+    <p:notesMasterId r:id="rId10"/>
   </p:notesMasterIdLst>
   <p:sldIdLst>
     <p:sldId id="256" r:id="rId2"/>
@@ -15,6 +15,7 @@
     <p:sldId id="259" r:id="rId6"/>
     <p:sldId id="260" r:id="rId7"/>
     <p:sldId id="262" r:id="rId8"/>
+    <p:sldId id="263" r:id="rId9"/>
   </p:sldIdLst>
   <p:sldSz cx="12192000" cy="6858000"/>
   <p:notesSz cx="6858000" cy="9144000"/>
@@ -124,7 +125,7 @@
 <file path=ppt/revisionInfo.xml><?xml version="1.0" encoding="utf-8"?>
 <p1510:revInfo xmlns:a="http://schemas.openxmlformats.org/drawingml/2006/main" xmlns:r="http://schemas.openxmlformats.org/officeDocument/2006/relationships" xmlns:p1510="http://schemas.microsoft.com/office/powerpoint/2015/10/main">
   <p1510:revLst>
-    <p1510:client id="{5F4E47BF-C800-49FE-85FB-10E0A96393C3}" v="17" dt="2024-04-25T20:07:36.426"/>
+    <p1510:client id="{5F4E47BF-C800-49FE-85FB-10E0A96393C3}" v="26" dt="2024-04-30T13:14:06.251"/>
   </p1510:revLst>
 </p1510:revInfo>
 </file>
@@ -3217,7 +3218,7 @@
   <pc:docChgLst>
     <pc:chgData name="MARTINEZ SALCEDO, JOSEPH" userId="4d2c8988-b1c0-4e9d-83be-da9944182c7d" providerId="ADAL" clId="{5F4E47BF-C800-49FE-85FB-10E0A96393C3}"/>
     <pc:docChg chg="undo custSel addSld modSld">
-      <pc:chgData name="MARTINEZ SALCEDO, JOSEPH" userId="4d2c8988-b1c0-4e9d-83be-da9944182c7d" providerId="ADAL" clId="{5F4E47BF-C800-49FE-85FB-10E0A96393C3}" dt="2024-04-25T20:07:36.426" v="70"/>
+      <pc:chgData name="MARTINEZ SALCEDO, JOSEPH" userId="4d2c8988-b1c0-4e9d-83be-da9944182c7d" providerId="ADAL" clId="{5F4E47BF-C800-49FE-85FB-10E0A96393C3}" dt="2024-04-30T13:49:44.778" v="196" actId="478"/>
       <pc:docMkLst>
         <pc:docMk/>
       </pc:docMkLst>
@@ -3852,8 +3853,8 @@
           </ac:cxnSpMkLst>
         </pc:cxnChg>
       </pc:sldChg>
-      <pc:sldChg chg="addSp modSp new">
-        <pc:chgData name="MARTINEZ SALCEDO, JOSEPH" userId="4d2c8988-b1c0-4e9d-83be-da9944182c7d" providerId="ADAL" clId="{5F4E47BF-C800-49FE-85FB-10E0A96393C3}" dt="2024-04-25T20:07:36.426" v="70"/>
+      <pc:sldChg chg="addSp modSp new mod">
+        <pc:chgData name="MARTINEZ SALCEDO, JOSEPH" userId="4d2c8988-b1c0-4e9d-83be-da9944182c7d" providerId="ADAL" clId="{5F4E47BF-C800-49FE-85FB-10E0A96393C3}" dt="2024-04-29T19:18:59.157" v="110" actId="20577"/>
         <pc:sldMkLst>
           <pc:docMk/>
           <pc:sldMk cId="3457545349" sldId="262"/>
@@ -3891,7 +3892,7 @@
           </ac:spMkLst>
         </pc:spChg>
         <pc:spChg chg="add mod">
-          <ac:chgData name="MARTINEZ SALCEDO, JOSEPH" userId="4d2c8988-b1c0-4e9d-83be-da9944182c7d" providerId="ADAL" clId="{5F4E47BF-C800-49FE-85FB-10E0A96393C3}" dt="2024-04-25T20:07:36.426" v="70"/>
+          <ac:chgData name="MARTINEZ SALCEDO, JOSEPH" userId="4d2c8988-b1c0-4e9d-83be-da9944182c7d" providerId="ADAL" clId="{5F4E47BF-C800-49FE-85FB-10E0A96393C3}" dt="2024-04-29T19:18:47.087" v="83" actId="20577"/>
           <ac:spMkLst>
             <pc:docMk/>
             <pc:sldMk cId="3457545349" sldId="262"/>
@@ -3899,7 +3900,7 @@
           </ac:spMkLst>
         </pc:spChg>
         <pc:spChg chg="add mod">
-          <ac:chgData name="MARTINEZ SALCEDO, JOSEPH" userId="4d2c8988-b1c0-4e9d-83be-da9944182c7d" providerId="ADAL" clId="{5F4E47BF-C800-49FE-85FB-10E0A96393C3}" dt="2024-04-25T20:07:36.426" v="70"/>
+          <ac:chgData name="MARTINEZ SALCEDO, JOSEPH" userId="4d2c8988-b1c0-4e9d-83be-da9944182c7d" providerId="ADAL" clId="{5F4E47BF-C800-49FE-85FB-10E0A96393C3}" dt="2024-04-29T19:18:59.157" v="110" actId="20577"/>
           <ac:spMkLst>
             <pc:docMk/>
             <pc:sldMk cId="3457545349" sldId="262"/>
@@ -3907,13 +3908,172 @@
           </ac:spMkLst>
         </pc:spChg>
         <pc:spChg chg="add mod">
-          <ac:chgData name="MARTINEZ SALCEDO, JOSEPH" userId="4d2c8988-b1c0-4e9d-83be-da9944182c7d" providerId="ADAL" clId="{5F4E47BF-C800-49FE-85FB-10E0A96393C3}" dt="2024-04-25T20:07:36.426" v="70"/>
+          <ac:chgData name="MARTINEZ SALCEDO, JOSEPH" userId="4d2c8988-b1c0-4e9d-83be-da9944182c7d" providerId="ADAL" clId="{5F4E47BF-C800-49FE-85FB-10E0A96393C3}" dt="2024-04-29T19:18:56.132" v="98" actId="313"/>
           <ac:spMkLst>
             <pc:docMk/>
             <pc:sldMk cId="3457545349" sldId="262"/>
             <ac:spMk id="8" creationId="{98EA4A48-CAAF-4A14-F154-4E66F0D89C5A}"/>
           </ac:spMkLst>
         </pc:spChg>
+      </pc:sldChg>
+      <pc:sldChg chg="addSp delSp modSp new mod setBg">
+        <pc:chgData name="MARTINEZ SALCEDO, JOSEPH" userId="4d2c8988-b1c0-4e9d-83be-da9944182c7d" providerId="ADAL" clId="{5F4E47BF-C800-49FE-85FB-10E0A96393C3}" dt="2024-04-30T13:49:44.778" v="196" actId="478"/>
+        <pc:sldMkLst>
+          <pc:docMk/>
+          <pc:sldMk cId="1867174918" sldId="263"/>
+        </pc:sldMkLst>
+        <pc:spChg chg="add mod">
+          <ac:chgData name="MARTINEZ SALCEDO, JOSEPH" userId="4d2c8988-b1c0-4e9d-83be-da9944182c7d" providerId="ADAL" clId="{5F4E47BF-C800-49FE-85FB-10E0A96393C3}" dt="2024-04-30T13:13:08.291" v="170" actId="20577"/>
+          <ac:spMkLst>
+            <pc:docMk/>
+            <pc:sldMk cId="1867174918" sldId="263"/>
+            <ac:spMk id="7" creationId="{C62D0D3D-7B25-7147-7C75-F6405E728011}"/>
+          </ac:spMkLst>
+        </pc:spChg>
+        <pc:spChg chg="add del mod">
+          <ac:chgData name="MARTINEZ SALCEDO, JOSEPH" userId="4d2c8988-b1c0-4e9d-83be-da9944182c7d" providerId="ADAL" clId="{5F4E47BF-C800-49FE-85FB-10E0A96393C3}" dt="2024-04-30T13:14:04.014" v="187" actId="1076"/>
+          <ac:spMkLst>
+            <pc:docMk/>
+            <pc:sldMk cId="1867174918" sldId="263"/>
+            <ac:spMk id="8" creationId="{7C897BE2-0D8F-E4FB-A5B0-019BC640068D}"/>
+          </ac:spMkLst>
+        </pc:spChg>
+        <pc:spChg chg="add del mod">
+          <ac:chgData name="MARTINEZ SALCEDO, JOSEPH" userId="4d2c8988-b1c0-4e9d-83be-da9944182c7d" providerId="ADAL" clId="{5F4E47BF-C800-49FE-85FB-10E0A96393C3}" dt="2024-04-30T13:14:13.243" v="190" actId="478"/>
+          <ac:spMkLst>
+            <pc:docMk/>
+            <pc:sldMk cId="1867174918" sldId="263"/>
+            <ac:spMk id="9" creationId="{1D0C7595-F158-0D72-6B40-97BBF758011D}"/>
+          </ac:spMkLst>
+        </pc:spChg>
+        <pc:spChg chg="add del mod ord">
+          <ac:chgData name="MARTINEZ SALCEDO, JOSEPH" userId="4d2c8988-b1c0-4e9d-83be-da9944182c7d" providerId="ADAL" clId="{5F4E47BF-C800-49FE-85FB-10E0A96393C3}" dt="2024-04-30T13:13:28.897" v="180" actId="478"/>
+          <ac:spMkLst>
+            <pc:docMk/>
+            <pc:sldMk cId="1867174918" sldId="263"/>
+            <ac:spMk id="1030" creationId="{417CDA24-35F8-4540-8C52-3096D6D94949}"/>
+          </ac:spMkLst>
+        </pc:spChg>
+        <pc:spChg chg="add del mod ord">
+          <ac:chgData name="MARTINEZ SALCEDO, JOSEPH" userId="4d2c8988-b1c0-4e9d-83be-da9944182c7d" providerId="ADAL" clId="{5F4E47BF-C800-49FE-85FB-10E0A96393C3}" dt="2024-04-30T13:13:28.897" v="180" actId="478"/>
+          <ac:spMkLst>
+            <pc:docMk/>
+            <pc:sldMk cId="1867174918" sldId="263"/>
+            <ac:spMk id="1031" creationId="{8658BFE0-4E65-4174-9C75-687C94E88273}"/>
+          </ac:spMkLst>
+        </pc:spChg>
+        <pc:spChg chg="add del mod ord">
+          <ac:chgData name="MARTINEZ SALCEDO, JOSEPH" userId="4d2c8988-b1c0-4e9d-83be-da9944182c7d" providerId="ADAL" clId="{5F4E47BF-C800-49FE-85FB-10E0A96393C3}" dt="2024-04-30T13:13:28.897" v="180" actId="478"/>
+          <ac:spMkLst>
+            <pc:docMk/>
+            <pc:sldMk cId="1867174918" sldId="263"/>
+            <ac:spMk id="1032" creationId="{FA75DFED-A0C1-4A83-BE1D-0271C1826EF6}"/>
+          </ac:spMkLst>
+        </pc:spChg>
+        <pc:graphicFrameChg chg="add mod">
+          <ac:chgData name="MARTINEZ SALCEDO, JOSEPH" userId="4d2c8988-b1c0-4e9d-83be-da9944182c7d" providerId="ADAL" clId="{5F4E47BF-C800-49FE-85FB-10E0A96393C3}" dt="2024-04-30T13:07:59.167" v="112"/>
+          <ac:graphicFrameMkLst>
+            <pc:docMk/>
+            <pc:sldMk cId="1867174918" sldId="263"/>
+            <ac:graphicFrameMk id="2" creationId="{22134EA1-1286-4B37-96E5-51329ED390A0}"/>
+          </ac:graphicFrameMkLst>
+        </pc:graphicFrameChg>
+        <pc:picChg chg="add del mod ord">
+          <ac:chgData name="MARTINEZ SALCEDO, JOSEPH" userId="4d2c8988-b1c0-4e9d-83be-da9944182c7d" providerId="ADAL" clId="{5F4E47BF-C800-49FE-85FB-10E0A96393C3}" dt="2024-04-30T13:13:09.113" v="171" actId="478"/>
+          <ac:picMkLst>
+            <pc:docMk/>
+            <pc:sldMk cId="1867174918" sldId="263"/>
+            <ac:picMk id="3" creationId="{0844EE13-5D66-0E9E-0FBE-D08F6E195BC0}"/>
+          </ac:picMkLst>
+        </pc:picChg>
+        <pc:picChg chg="add del mod ord">
+          <ac:chgData name="MARTINEZ SALCEDO, JOSEPH" userId="4d2c8988-b1c0-4e9d-83be-da9944182c7d" providerId="ADAL" clId="{5F4E47BF-C800-49FE-85FB-10E0A96393C3}" dt="2024-04-30T13:13:12.038" v="172" actId="1076"/>
+          <ac:picMkLst>
+            <pc:docMk/>
+            <pc:sldMk cId="1867174918" sldId="263"/>
+            <ac:picMk id="4" creationId="{F3D35332-4376-2C85-1BFA-A4BF949107A0}"/>
+          </ac:picMkLst>
+        </pc:picChg>
+        <pc:picChg chg="add del mod">
+          <ac:chgData name="MARTINEZ SALCEDO, JOSEPH" userId="4d2c8988-b1c0-4e9d-83be-da9944182c7d" providerId="ADAL" clId="{5F4E47BF-C800-49FE-85FB-10E0A96393C3}" dt="2024-04-30T13:13:29.817" v="181" actId="478"/>
+          <ac:picMkLst>
+            <pc:docMk/>
+            <pc:sldMk cId="1867174918" sldId="263"/>
+            <ac:picMk id="5" creationId="{300A9637-110C-84D5-43C5-B11890F2BB23}"/>
+          </ac:picMkLst>
+        </pc:picChg>
+        <pc:picChg chg="add mod ord">
+          <ac:chgData name="MARTINEZ SALCEDO, JOSEPH" userId="4d2c8988-b1c0-4e9d-83be-da9944182c7d" providerId="ADAL" clId="{5F4E47BF-C800-49FE-85FB-10E0A96393C3}" dt="2024-04-30T13:14:04.014" v="187" actId="1076"/>
+          <ac:picMkLst>
+            <pc:docMk/>
+            <pc:sldMk cId="1867174918" sldId="263"/>
+            <ac:picMk id="6" creationId="{F1A45BCA-2B63-7339-2E39-1FEA9A07173A}"/>
+          </ac:picMkLst>
+        </pc:picChg>
+        <pc:picChg chg="add mod">
+          <ac:chgData name="MARTINEZ SALCEDO, JOSEPH" userId="4d2c8988-b1c0-4e9d-83be-da9944182c7d" providerId="ADAL" clId="{5F4E47BF-C800-49FE-85FB-10E0A96393C3}" dt="2024-04-30T13:08:03.040" v="113"/>
+          <ac:picMkLst>
+            <pc:docMk/>
+            <pc:sldMk cId="1867174918" sldId="263"/>
+            <ac:picMk id="1025" creationId="{84DE17A1-644A-BFBC-09F3-44492D426840}"/>
+          </ac:picMkLst>
+        </pc:picChg>
+        <pc:picChg chg="add mod">
+          <ac:chgData name="MARTINEZ SALCEDO, JOSEPH" userId="4d2c8988-b1c0-4e9d-83be-da9944182c7d" providerId="ADAL" clId="{5F4E47BF-C800-49FE-85FB-10E0A96393C3}" dt="2024-04-30T13:08:03.040" v="113"/>
+          <ac:picMkLst>
+            <pc:docMk/>
+            <pc:sldMk cId="1867174918" sldId="263"/>
+            <ac:picMk id="1026" creationId="{5D7A3DBC-D2B9-CC87-2072-4ED5DD14D544}"/>
+          </ac:picMkLst>
+        </pc:picChg>
+        <pc:picChg chg="add mod">
+          <ac:chgData name="MARTINEZ SALCEDO, JOSEPH" userId="4d2c8988-b1c0-4e9d-83be-da9944182c7d" providerId="ADAL" clId="{5F4E47BF-C800-49FE-85FB-10E0A96393C3}" dt="2024-04-30T13:08:03.040" v="113"/>
+          <ac:picMkLst>
+            <pc:docMk/>
+            <pc:sldMk cId="1867174918" sldId="263"/>
+            <ac:picMk id="1027" creationId="{92C5BD37-228B-6FA3-8F5F-2650E3FF1644}"/>
+          </ac:picMkLst>
+        </pc:picChg>
+        <pc:picChg chg="add mod">
+          <ac:chgData name="MARTINEZ SALCEDO, JOSEPH" userId="4d2c8988-b1c0-4e9d-83be-da9944182c7d" providerId="ADAL" clId="{5F4E47BF-C800-49FE-85FB-10E0A96393C3}" dt="2024-04-30T13:08:03.040" v="113"/>
+          <ac:picMkLst>
+            <pc:docMk/>
+            <pc:sldMk cId="1867174918" sldId="263"/>
+            <ac:picMk id="1028" creationId="{9CA9514D-8C9F-0096-C1DC-F9CB8B092FCC}"/>
+          </ac:picMkLst>
+        </pc:picChg>
+        <pc:cxnChg chg="add del">
+          <ac:chgData name="MARTINEZ SALCEDO, JOSEPH" userId="4d2c8988-b1c0-4e9d-83be-da9944182c7d" providerId="ADAL" clId="{5F4E47BF-C800-49FE-85FB-10E0A96393C3}" dt="2024-04-30T13:08:48.925" v="122" actId="26606"/>
+          <ac:cxnSpMkLst>
+            <pc:docMk/>
+            <pc:sldMk cId="1867174918" sldId="263"/>
+            <ac:cxnSpMk id="11" creationId="{91B6081D-D3E8-4209-B85B-EB1C655A6272}"/>
+          </ac:cxnSpMkLst>
+        </pc:cxnChg>
+        <pc:cxnChg chg="add del mod">
+          <ac:chgData name="MARTINEZ SALCEDO, JOSEPH" userId="4d2c8988-b1c0-4e9d-83be-da9944182c7d" providerId="ADAL" clId="{5F4E47BF-C800-49FE-85FB-10E0A96393C3}" dt="2024-04-30T13:49:44.778" v="196" actId="478"/>
+          <ac:cxnSpMkLst>
+            <pc:docMk/>
+            <pc:sldMk cId="1867174918" sldId="263"/>
+            <ac:cxnSpMk id="12" creationId="{99C2F409-E36A-D670-307C-1E89EF931B97}"/>
+          </ac:cxnSpMkLst>
+        </pc:cxnChg>
+        <pc:cxnChg chg="add del">
+          <ac:chgData name="MARTINEZ SALCEDO, JOSEPH" userId="4d2c8988-b1c0-4e9d-83be-da9944182c7d" providerId="ADAL" clId="{5F4E47BF-C800-49FE-85FB-10E0A96393C3}" dt="2024-04-30T13:08:48.925" v="122" actId="26606"/>
+          <ac:cxnSpMkLst>
+            <pc:docMk/>
+            <pc:sldMk cId="1867174918" sldId="263"/>
+            <ac:cxnSpMk id="13" creationId="{28CA55E4-1295-45C8-BA05-5A9E705B749A}"/>
+          </ac:cxnSpMkLst>
+        </pc:cxnChg>
+        <pc:cxnChg chg="add del">
+          <ac:chgData name="MARTINEZ SALCEDO, JOSEPH" userId="4d2c8988-b1c0-4e9d-83be-da9944182c7d" providerId="ADAL" clId="{5F4E47BF-C800-49FE-85FB-10E0A96393C3}" dt="2024-04-30T13:08:48.925" v="122" actId="26606"/>
+          <ac:cxnSpMkLst>
+            <pc:docMk/>
+            <pc:sldMk cId="1867174918" sldId="263"/>
+            <ac:cxnSpMk id="15" creationId="{08C5794E-A9A1-4A23-AF68-C79A7822334C}"/>
+          </ac:cxnSpMkLst>
+        </pc:cxnChg>
       </pc:sldChg>
     </pc:docChg>
   </pc:docChgLst>
@@ -4498,7 +4658,7 @@
           <a:p>
             <a:fld id="{CA9DB0A2-6F6E-4504-BAFA-49E601213F8A}" type="datetimeFigureOut">
               <a:rPr lang="en-US" smtClean="0"/>
-              <a:t>4/25/2024</a:t>
+              <a:t>4/30/2024</a:t>
             </a:fld>
             <a:endParaRPr lang="en-US"/>
           </a:p>
@@ -5080,7 +5240,7 @@
           <a:p>
             <a:fld id="{AF4D99D7-7266-4400-BC17-868CD1AF0CEF}" type="datetimeFigureOut">
               <a:rPr lang="en-US" smtClean="0"/>
-              <a:t>4/25/2024</a:t>
+              <a:t>4/30/2024</a:t>
             </a:fld>
             <a:endParaRPr lang="en-US"/>
           </a:p>
@@ -5278,7 +5438,7 @@
           <a:p>
             <a:fld id="{AF4D99D7-7266-4400-BC17-868CD1AF0CEF}" type="datetimeFigureOut">
               <a:rPr lang="en-US" smtClean="0"/>
-              <a:t>4/25/2024</a:t>
+              <a:t>4/30/2024</a:t>
             </a:fld>
             <a:endParaRPr lang="en-US"/>
           </a:p>
@@ -5486,7 +5646,7 @@
           <a:p>
             <a:fld id="{AF4D99D7-7266-4400-BC17-868CD1AF0CEF}" type="datetimeFigureOut">
               <a:rPr lang="en-US" smtClean="0"/>
-              <a:t>4/25/2024</a:t>
+              <a:t>4/30/2024</a:t>
             </a:fld>
             <a:endParaRPr lang="en-US"/>
           </a:p>
@@ -5684,7 +5844,7 @@
           <a:p>
             <a:fld id="{AF4D99D7-7266-4400-BC17-868CD1AF0CEF}" type="datetimeFigureOut">
               <a:rPr lang="en-US" smtClean="0"/>
-              <a:t>4/25/2024</a:t>
+              <a:t>4/30/2024</a:t>
             </a:fld>
             <a:endParaRPr lang="en-US"/>
           </a:p>
@@ -5959,7 +6119,7 @@
           <a:p>
             <a:fld id="{AF4D99D7-7266-4400-BC17-868CD1AF0CEF}" type="datetimeFigureOut">
               <a:rPr lang="en-US" smtClean="0"/>
-              <a:t>4/25/2024</a:t>
+              <a:t>4/30/2024</a:t>
             </a:fld>
             <a:endParaRPr lang="en-US"/>
           </a:p>
@@ -6224,7 +6384,7 @@
           <a:p>
             <a:fld id="{AF4D99D7-7266-4400-BC17-868CD1AF0CEF}" type="datetimeFigureOut">
               <a:rPr lang="en-US" smtClean="0"/>
-              <a:t>4/25/2024</a:t>
+              <a:t>4/30/2024</a:t>
             </a:fld>
             <a:endParaRPr lang="en-US"/>
           </a:p>
@@ -6636,7 +6796,7 @@
           <a:p>
             <a:fld id="{AF4D99D7-7266-4400-BC17-868CD1AF0CEF}" type="datetimeFigureOut">
               <a:rPr lang="en-US" smtClean="0"/>
-              <a:t>4/25/2024</a:t>
+              <a:t>4/30/2024</a:t>
             </a:fld>
             <a:endParaRPr lang="en-US"/>
           </a:p>
@@ -6777,7 +6937,7 @@
           <a:p>
             <a:fld id="{AF4D99D7-7266-4400-BC17-868CD1AF0CEF}" type="datetimeFigureOut">
               <a:rPr lang="en-US" smtClean="0"/>
-              <a:t>4/25/2024</a:t>
+              <a:t>4/30/2024</a:t>
             </a:fld>
             <a:endParaRPr lang="en-US"/>
           </a:p>
@@ -6890,7 +7050,7 @@
           <a:p>
             <a:fld id="{AF4D99D7-7266-4400-BC17-868CD1AF0CEF}" type="datetimeFigureOut">
               <a:rPr lang="en-US" smtClean="0"/>
-              <a:t>4/25/2024</a:t>
+              <a:t>4/30/2024</a:t>
             </a:fld>
             <a:endParaRPr lang="en-US"/>
           </a:p>
@@ -7201,7 +7361,7 @@
           <a:p>
             <a:fld id="{AF4D99D7-7266-4400-BC17-868CD1AF0CEF}" type="datetimeFigureOut">
               <a:rPr lang="en-US" smtClean="0"/>
-              <a:t>4/25/2024</a:t>
+              <a:t>4/30/2024</a:t>
             </a:fld>
             <a:endParaRPr lang="en-US"/>
           </a:p>
@@ -7489,7 +7649,7 @@
           <a:p>
             <a:fld id="{AF4D99D7-7266-4400-BC17-868CD1AF0CEF}" type="datetimeFigureOut">
               <a:rPr lang="en-US" smtClean="0"/>
-              <a:t>4/25/2024</a:t>
+              <a:t>4/30/2024</a:t>
             </a:fld>
             <a:endParaRPr lang="en-US"/>
           </a:p>
@@ -7730,7 +7890,7 @@
           <a:p>
             <a:fld id="{AF4D99D7-7266-4400-BC17-868CD1AF0CEF}" type="datetimeFigureOut">
               <a:rPr lang="en-US" smtClean="0"/>
-              <a:t>4/25/2024</a:t>
+              <a:t>4/30/2024</a:t>
             </a:fld>
             <a:endParaRPr lang="en-US"/>
           </a:p>
@@ -17502,7 +17662,7 @@
                 </a:solidFill>
                 <a:latin typeface="Aptos" panose="020B0004020202020204" pitchFamily="34" charset="0"/>
               </a:rPr>
-              <a:t>infrastructure</a:t>
+              <a:t>environmental</a:t>
             </a:r>
           </a:p>
         </p:txBody>
@@ -17559,7 +17719,7 @@
                 </a:solidFill>
                 <a:latin typeface="Aptos" panose="020B0004020202020204" pitchFamily="34" charset="0"/>
               </a:rPr>
-              <a:t>technological</a:t>
+              <a:t>ecological</a:t>
             </a:r>
           </a:p>
         </p:txBody>
@@ -17614,7 +17774,7 @@
                 </a:solidFill>
                 <a:latin typeface="Aptos" panose="020B0004020202020204" pitchFamily="34" charset="0"/>
               </a:rPr>
-              <a:t>environmental</a:t>
+              <a:t>technological</a:t>
             </a:r>
           </a:p>
         </p:txBody>
@@ -17623,6 +17783,202 @@
     <p:extLst>
       <p:ext uri="{BB962C8B-B14F-4D97-AF65-F5344CB8AC3E}">
         <p14:creationId xmlns:p14="http://schemas.microsoft.com/office/powerpoint/2010/main" val="3457545349"/>
+      </p:ext>
+    </p:extLst>
+  </p:cSld>
+  <p:clrMapOvr>
+    <a:masterClrMapping/>
+  </p:clrMapOvr>
+</p:sld>
+</file>
+
+<file path=ppt/slides/slide8.xml><?xml version="1.0" encoding="utf-8"?>
+<p:sld xmlns:a="http://schemas.openxmlformats.org/drawingml/2006/main" xmlns:r="http://schemas.openxmlformats.org/officeDocument/2006/relationships" xmlns:p="http://schemas.openxmlformats.org/presentationml/2006/main">
+  <p:cSld>
+    <p:bg>
+      <p:bgPr>
+        <a:solidFill>
+          <a:schemeClr val="bg1"/>
+        </a:solidFill>
+        <a:effectLst/>
+      </p:bgPr>
+    </p:bg>
+    <p:spTree>
+      <p:nvGrpSpPr>
+        <p:cNvPr id="1" name=""/>
+        <p:cNvGrpSpPr/>
+        <p:nvPr/>
+      </p:nvGrpSpPr>
+      <p:grpSpPr>
+        <a:xfrm>
+          <a:off x="0" y="0"/>
+          <a:ext cx="0" cy="0"/>
+          <a:chOff x="0" y="0"/>
+          <a:chExt cx="0" cy="0"/>
+        </a:xfrm>
+      </p:grpSpPr>
+      <p:pic>
+        <p:nvPicPr>
+          <p:cNvPr id="6" name="Picture 5" descr="A map of the world&#10;&#10;Description automatically generated">
+            <a:extLst>
+              <a:ext uri="{FF2B5EF4-FFF2-40B4-BE49-F238E27FC236}">
+                <a16:creationId xmlns:a16="http://schemas.microsoft.com/office/drawing/2014/main" id="{F1A45BCA-2B63-7339-2E39-1FEA9A07173A}"/>
+              </a:ext>
+            </a:extLst>
+          </p:cNvPr>
+          <p:cNvPicPr>
+            <a:picLocks noChangeAspect="1"/>
+          </p:cNvPicPr>
+          <p:nvPr/>
+        </p:nvPicPr>
+        <p:blipFill rotWithShape="1">
+          <a:blip r:embed="rId2">
+            <a:extLst>
+              <a:ext uri="{28A0092B-C50C-407E-A947-70E740481C1C}">
+                <a14:useLocalDpi xmlns:a14="http://schemas.microsoft.com/office/drawing/2010/main" val="0"/>
+              </a:ext>
+            </a:extLst>
+          </a:blip>
+          <a:srcRect l="9309" t="2174" r="4627" b="12620"/>
+          <a:stretch/>
+        </p:blipFill>
+        <p:spPr bwMode="auto">
+          <a:xfrm>
+            <a:off x="5575934" y="454512"/>
+            <a:ext cx="5486400" cy="2756590"/>
+          </a:xfrm>
+          <a:prstGeom prst="rect">
+            <a:avLst/>
+          </a:prstGeom>
+          <a:noFill/>
+          <a:extLst>
+            <a:ext uri="{53640926-AAD7-44D8-BBD7-CCE9431645EC}">
+              <a14:shadowObscured xmlns:a14="http://schemas.microsoft.com/office/drawing/2010/main"/>
+            </a:ext>
+          </a:extLst>
+        </p:spPr>
+      </p:pic>
+      <p:pic>
+        <p:nvPicPr>
+          <p:cNvPr id="4" name="Picture 3" descr="A map of the world&#10;&#10;Description automatically generated">
+            <a:extLst>
+              <a:ext uri="{FF2B5EF4-FFF2-40B4-BE49-F238E27FC236}">
+                <a16:creationId xmlns:a16="http://schemas.microsoft.com/office/drawing/2014/main" id="{F3D35332-4376-2C85-1BFA-A4BF949107A0}"/>
+              </a:ext>
+            </a:extLst>
+          </p:cNvPr>
+          <p:cNvPicPr>
+            <a:picLocks noChangeAspect="1"/>
+          </p:cNvPicPr>
+          <p:nvPr/>
+        </p:nvPicPr>
+        <p:blipFill rotWithShape="1">
+          <a:blip r:embed="rId3">
+            <a:extLst>
+              <a:ext uri="{28A0092B-C50C-407E-A947-70E740481C1C}">
+                <a14:useLocalDpi xmlns:a14="http://schemas.microsoft.com/office/drawing/2010/main" val="0"/>
+              </a:ext>
+            </a:extLst>
+          </a:blip>
+          <a:srcRect l="7926" t="9687" r="-2" b="8594"/>
+          <a:stretch/>
+        </p:blipFill>
+        <p:spPr bwMode="auto">
+          <a:xfrm>
+            <a:off x="317936" y="520831"/>
+            <a:ext cx="5486400" cy="2690271"/>
+          </a:xfrm>
+          <a:prstGeom prst="rect">
+            <a:avLst/>
+          </a:prstGeom>
+          <a:noFill/>
+          <a:extLst>
+            <a:ext uri="{53640926-AAD7-44D8-BBD7-CCE9431645EC}">
+              <a14:shadowObscured xmlns:a14="http://schemas.microsoft.com/office/drawing/2010/main"/>
+            </a:ext>
+          </a:extLst>
+        </p:spPr>
+      </p:pic>
+      <p:sp>
+        <p:nvSpPr>
+          <p:cNvPr id="7" name="TextBox 6">
+            <a:extLst>
+              <a:ext uri="{FF2B5EF4-FFF2-40B4-BE49-F238E27FC236}">
+                <a16:creationId xmlns:a16="http://schemas.microsoft.com/office/drawing/2014/main" id="{C62D0D3D-7B25-7147-7C75-F6405E728011}"/>
+              </a:ext>
+            </a:extLst>
+          </p:cNvPr>
+          <p:cNvSpPr txBox="1"/>
+          <p:nvPr/>
+        </p:nvSpPr>
+        <p:spPr>
+          <a:xfrm>
+            <a:off x="2714426" y="60017"/>
+            <a:ext cx="697627" cy="369332"/>
+          </a:xfrm>
+          <a:prstGeom prst="rect">
+            <a:avLst/>
+          </a:prstGeom>
+          <a:noFill/>
+        </p:spPr>
+        <p:txBody>
+          <a:bodyPr wrap="none" rtlCol="0">
+            <a:spAutoFit/>
+          </a:bodyPr>
+          <a:lstStyle/>
+          <a:p>
+            <a:r>
+              <a:rPr lang="en-US" b="1" dirty="0">
+                <a:latin typeface="Arial" panose="020B0604020202020204" pitchFamily="34" charset="0"/>
+                <a:cs typeface="Arial" panose="020B0604020202020204" pitchFamily="34" charset="0"/>
+              </a:rPr>
+              <a:t>2019</a:t>
+            </a:r>
+          </a:p>
+        </p:txBody>
+      </p:sp>
+      <p:sp>
+        <p:nvSpPr>
+          <p:cNvPr id="8" name="TextBox 7">
+            <a:extLst>
+              <a:ext uri="{FF2B5EF4-FFF2-40B4-BE49-F238E27FC236}">
+                <a16:creationId xmlns:a16="http://schemas.microsoft.com/office/drawing/2014/main" id="{7C897BE2-0D8F-E4FB-A5B0-019BC640068D}"/>
+              </a:ext>
+            </a:extLst>
+          </p:cNvPr>
+          <p:cNvSpPr txBox="1"/>
+          <p:nvPr/>
+        </p:nvSpPr>
+        <p:spPr>
+          <a:xfrm>
+            <a:off x="7970321" y="60017"/>
+            <a:ext cx="697627" cy="369332"/>
+          </a:xfrm>
+          <a:prstGeom prst="rect">
+            <a:avLst/>
+          </a:prstGeom>
+          <a:noFill/>
+        </p:spPr>
+        <p:txBody>
+          <a:bodyPr wrap="none" rtlCol="0">
+            <a:spAutoFit/>
+          </a:bodyPr>
+          <a:lstStyle/>
+          <a:p>
+            <a:r>
+              <a:rPr lang="en-US" b="1" dirty="0">
+                <a:latin typeface="Arial" panose="020B0604020202020204" pitchFamily="34" charset="0"/>
+                <a:cs typeface="Arial" panose="020B0604020202020204" pitchFamily="34" charset="0"/>
+              </a:rPr>
+              <a:t>2023</a:t>
+            </a:r>
+          </a:p>
+        </p:txBody>
+      </p:sp>
+    </p:spTree>
+    <p:extLst>
+      <p:ext uri="{BB962C8B-B14F-4D97-AF65-F5344CB8AC3E}">
+        <p14:creationId xmlns:p14="http://schemas.microsoft.com/office/powerpoint/2010/main" val="1867174918"/>
       </p:ext>
     </p:extLst>
   </p:cSld>

</xml_diff>

<commit_message>
updated typology of shocks to conect with indicators
</commit_message>
<xml_diff>
--- a/docs/graphs.pptx
+++ b/docs/graphs.pptx
@@ -5,7 +5,7 @@
     <p:sldMasterId id="2147483648" r:id="rId1"/>
   </p:sldMasterIdLst>
   <p:notesMasterIdLst>
-    <p:notesMasterId r:id="rId10"/>
+    <p:notesMasterId r:id="rId11"/>
   </p:notesMasterIdLst>
   <p:sldIdLst>
     <p:sldId id="256" r:id="rId2"/>
@@ -15,7 +15,8 @@
     <p:sldId id="259" r:id="rId6"/>
     <p:sldId id="260" r:id="rId7"/>
     <p:sldId id="262" r:id="rId8"/>
-    <p:sldId id="263" r:id="rId9"/>
+    <p:sldId id="264" r:id="rId9"/>
+    <p:sldId id="263" r:id="rId10"/>
   </p:sldIdLst>
   <p:sldSz cx="12192000" cy="6858000"/>
   <p:notesSz cx="6858000" cy="9144000"/>
@@ -125,7 +126,7 @@
 <file path=ppt/revisionInfo.xml><?xml version="1.0" encoding="utf-8"?>
 <p1510:revInfo xmlns:a="http://schemas.openxmlformats.org/drawingml/2006/main" xmlns:r="http://schemas.openxmlformats.org/officeDocument/2006/relationships" xmlns:p1510="http://schemas.microsoft.com/office/powerpoint/2015/10/main">
   <p1510:revLst>
-    <p1510:client id="{5F4E47BF-C800-49FE-85FB-10E0A96393C3}" v="26" dt="2024-04-30T13:14:06.251"/>
+    <p1510:client id="{5F4E47BF-C800-49FE-85FB-10E0A96393C3}" v="44" dt="2024-04-30T19:33:23.303"/>
   </p1510:revLst>
 </p1510:revInfo>
 </file>
@@ -3218,7 +3219,7 @@
   <pc:docChgLst>
     <pc:chgData name="MARTINEZ SALCEDO, JOSEPH" userId="4d2c8988-b1c0-4e9d-83be-da9944182c7d" providerId="ADAL" clId="{5F4E47BF-C800-49FE-85FB-10E0A96393C3}"/>
     <pc:docChg chg="undo custSel addSld modSld">
-      <pc:chgData name="MARTINEZ SALCEDO, JOSEPH" userId="4d2c8988-b1c0-4e9d-83be-da9944182c7d" providerId="ADAL" clId="{5F4E47BF-C800-49FE-85FB-10E0A96393C3}" dt="2024-04-30T13:49:44.778" v="196" actId="478"/>
+      <pc:chgData name="MARTINEZ SALCEDO, JOSEPH" userId="4d2c8988-b1c0-4e9d-83be-da9944182c7d" providerId="ADAL" clId="{5F4E47BF-C800-49FE-85FB-10E0A96393C3}" dt="2024-04-30T19:33:34.796" v="1090" actId="1076"/>
       <pc:docMkLst>
         <pc:docMk/>
       </pc:docMkLst>
@@ -4074,6 +4075,213 @@
             <ac:cxnSpMk id="15" creationId="{08C5794E-A9A1-4A23-AF68-C79A7822334C}"/>
           </ac:cxnSpMkLst>
         </pc:cxnChg>
+      </pc:sldChg>
+      <pc:sldChg chg="addSp delSp modSp add mod">
+        <pc:chgData name="MARTINEZ SALCEDO, JOSEPH" userId="4d2c8988-b1c0-4e9d-83be-da9944182c7d" providerId="ADAL" clId="{5F4E47BF-C800-49FE-85FB-10E0A96393C3}" dt="2024-04-30T19:33:34.796" v="1090" actId="1076"/>
+        <pc:sldMkLst>
+          <pc:docMk/>
+          <pc:sldMk cId="3860791488" sldId="264"/>
+        </pc:sldMkLst>
+        <pc:spChg chg="del">
+          <ac:chgData name="MARTINEZ SALCEDO, JOSEPH" userId="4d2c8988-b1c0-4e9d-83be-da9944182c7d" providerId="ADAL" clId="{5F4E47BF-C800-49FE-85FB-10E0A96393C3}" dt="2024-04-30T14:58:43.153" v="198" actId="478"/>
+          <ac:spMkLst>
+            <pc:docMk/>
+            <pc:sldMk cId="3860791488" sldId="264"/>
+            <ac:spMk id="2" creationId="{29398666-0096-5542-B230-404604A9AB87}"/>
+          </ac:spMkLst>
+        </pc:spChg>
+        <pc:spChg chg="add mod">
+          <ac:chgData name="MARTINEZ SALCEDO, JOSEPH" userId="4d2c8988-b1c0-4e9d-83be-da9944182c7d" providerId="ADAL" clId="{5F4E47BF-C800-49FE-85FB-10E0A96393C3}" dt="2024-04-30T19:33:34.796" v="1090" actId="1076"/>
+          <ac:spMkLst>
+            <pc:docMk/>
+            <pc:sldMk cId="3860791488" sldId="264"/>
+            <ac:spMk id="2" creationId="{B499D3E3-37DC-0E5C-78DC-7DF28F1E951E}"/>
+          </ac:spMkLst>
+        </pc:spChg>
+        <pc:spChg chg="mod">
+          <ac:chgData name="MARTINEZ SALCEDO, JOSEPH" userId="4d2c8988-b1c0-4e9d-83be-da9944182c7d" providerId="ADAL" clId="{5F4E47BF-C800-49FE-85FB-10E0A96393C3}" dt="2024-04-30T19:31:20.755" v="1054" actId="14100"/>
+          <ac:spMkLst>
+            <pc:docMk/>
+            <pc:sldMk cId="3860791488" sldId="264"/>
+            <ac:spMk id="3" creationId="{731AD656-B7B0-3989-3400-7BB299B75B2D}"/>
+          </ac:spMkLst>
+        </pc:spChg>
+        <pc:spChg chg="mod ord">
+          <ac:chgData name="MARTINEZ SALCEDO, JOSEPH" userId="4d2c8988-b1c0-4e9d-83be-da9944182c7d" providerId="ADAL" clId="{5F4E47BF-C800-49FE-85FB-10E0A96393C3}" dt="2024-04-30T19:31:25.146" v="1057" actId="14100"/>
+          <ac:spMkLst>
+            <pc:docMk/>
+            <pc:sldMk cId="3860791488" sldId="264"/>
+            <ac:spMk id="4" creationId="{B470F236-1BAA-9B5C-FBE4-F397A4A24C73}"/>
+          </ac:spMkLst>
+        </pc:spChg>
+        <pc:spChg chg="mod">
+          <ac:chgData name="MARTINEZ SALCEDO, JOSEPH" userId="4d2c8988-b1c0-4e9d-83be-da9944182c7d" providerId="ADAL" clId="{5F4E47BF-C800-49FE-85FB-10E0A96393C3}" dt="2024-04-30T15:42:51.598" v="984" actId="14100"/>
+          <ac:spMkLst>
+            <pc:docMk/>
+            <pc:sldMk cId="3860791488" sldId="264"/>
+            <ac:spMk id="5" creationId="{88B23CA9-A1B3-E875-02FC-991517812786}"/>
+          </ac:spMkLst>
+        </pc:spChg>
+        <pc:spChg chg="mod">
+          <ac:chgData name="MARTINEZ SALCEDO, JOSEPH" userId="4d2c8988-b1c0-4e9d-83be-da9944182c7d" providerId="ADAL" clId="{5F4E47BF-C800-49FE-85FB-10E0A96393C3}" dt="2024-04-30T19:30:44.667" v="1051" actId="14100"/>
+          <ac:spMkLst>
+            <pc:docMk/>
+            <pc:sldMk cId="3860791488" sldId="264"/>
+            <ac:spMk id="6" creationId="{7F4474ED-DA02-6F86-758F-11D7A8BBAAF6}"/>
+          </ac:spMkLst>
+        </pc:spChg>
+        <pc:spChg chg="del mod">
+          <ac:chgData name="MARTINEZ SALCEDO, JOSEPH" userId="4d2c8988-b1c0-4e9d-83be-da9944182c7d" providerId="ADAL" clId="{5F4E47BF-C800-49FE-85FB-10E0A96393C3}" dt="2024-04-30T15:22:24.815" v="721" actId="478"/>
+          <ac:spMkLst>
+            <pc:docMk/>
+            <pc:sldMk cId="3860791488" sldId="264"/>
+            <ac:spMk id="7" creationId="{7F1980A3-5115-9F32-0AB4-F4BD0AD7BCB4}"/>
+          </ac:spMkLst>
+        </pc:spChg>
+        <pc:spChg chg="add mod">
+          <ac:chgData name="MARTINEZ SALCEDO, JOSEPH" userId="4d2c8988-b1c0-4e9d-83be-da9944182c7d" providerId="ADAL" clId="{5F4E47BF-C800-49FE-85FB-10E0A96393C3}" dt="2024-04-30T19:30:48.611" v="1052" actId="1076"/>
+          <ac:spMkLst>
+            <pc:docMk/>
+            <pc:sldMk cId="3860791488" sldId="264"/>
+            <ac:spMk id="7" creationId="{999A31C0-8D4C-B0A3-F4DE-91883D692739}"/>
+          </ac:spMkLst>
+        </pc:spChg>
+        <pc:spChg chg="add mod">
+          <ac:chgData name="MARTINEZ SALCEDO, JOSEPH" userId="4d2c8988-b1c0-4e9d-83be-da9944182c7d" providerId="ADAL" clId="{5F4E47BF-C800-49FE-85FB-10E0A96393C3}" dt="2024-04-30T19:29:35.755" v="1035" actId="1076"/>
+          <ac:spMkLst>
+            <pc:docMk/>
+            <pc:sldMk cId="3860791488" sldId="264"/>
+            <ac:spMk id="8" creationId="{1FEEA11E-76BF-BFFC-336E-179072560DEF}"/>
+          </ac:spMkLst>
+        </pc:spChg>
+        <pc:spChg chg="del mod">
+          <ac:chgData name="MARTINEZ SALCEDO, JOSEPH" userId="4d2c8988-b1c0-4e9d-83be-da9944182c7d" providerId="ADAL" clId="{5F4E47BF-C800-49FE-85FB-10E0A96393C3}" dt="2024-04-30T15:22:31.749" v="732" actId="478"/>
+          <ac:spMkLst>
+            <pc:docMk/>
+            <pc:sldMk cId="3860791488" sldId="264"/>
+            <ac:spMk id="8" creationId="{98EA4A48-CAAF-4A14-F154-4E66F0D89C5A}"/>
+          </ac:spMkLst>
+        </pc:spChg>
+        <pc:spChg chg="add mod">
+          <ac:chgData name="MARTINEZ SALCEDO, JOSEPH" userId="4d2c8988-b1c0-4e9d-83be-da9944182c7d" providerId="ADAL" clId="{5F4E47BF-C800-49FE-85FB-10E0A96393C3}" dt="2024-04-30T19:32:52.907" v="1082" actId="20577"/>
+          <ac:spMkLst>
+            <pc:docMk/>
+            <pc:sldMk cId="3860791488" sldId="264"/>
+            <ac:spMk id="9" creationId="{A76962F9-E2BD-6770-2F68-C6208D504AA4}"/>
+          </ac:spMkLst>
+        </pc:spChg>
+        <pc:spChg chg="add del mod ord">
+          <ac:chgData name="MARTINEZ SALCEDO, JOSEPH" userId="4d2c8988-b1c0-4e9d-83be-da9944182c7d" providerId="ADAL" clId="{5F4E47BF-C800-49FE-85FB-10E0A96393C3}" dt="2024-04-30T15:08:01.815" v="501"/>
+          <ac:spMkLst>
+            <pc:docMk/>
+            <pc:sldMk cId="3860791488" sldId="264"/>
+            <ac:spMk id="10" creationId="{0B37A814-03ED-FBF2-D997-21411EE07381}"/>
+          </ac:spMkLst>
+        </pc:spChg>
+        <pc:spChg chg="add del mod">
+          <ac:chgData name="MARTINEZ SALCEDO, JOSEPH" userId="4d2c8988-b1c0-4e9d-83be-da9944182c7d" providerId="ADAL" clId="{5F4E47BF-C800-49FE-85FB-10E0A96393C3}" dt="2024-04-30T15:09:25.826" v="525"/>
+          <ac:spMkLst>
+            <pc:docMk/>
+            <pc:sldMk cId="3860791488" sldId="264"/>
+            <ac:spMk id="11" creationId="{00054EF6-5AC7-8E92-1006-BACA8D49B4C9}"/>
+          </ac:spMkLst>
+        </pc:spChg>
+        <pc:spChg chg="add mod">
+          <ac:chgData name="MARTINEZ SALCEDO, JOSEPH" userId="4d2c8988-b1c0-4e9d-83be-da9944182c7d" providerId="ADAL" clId="{5F4E47BF-C800-49FE-85FB-10E0A96393C3}" dt="2024-04-30T19:31:33.548" v="1058" actId="1076"/>
+          <ac:spMkLst>
+            <pc:docMk/>
+            <pc:sldMk cId="3860791488" sldId="264"/>
+            <ac:spMk id="12" creationId="{2DAE8C09-D3C4-20D6-8688-5A574392747E}"/>
+          </ac:spMkLst>
+        </pc:spChg>
+        <pc:spChg chg="add mod">
+          <ac:chgData name="MARTINEZ SALCEDO, JOSEPH" userId="4d2c8988-b1c0-4e9d-83be-da9944182c7d" providerId="ADAL" clId="{5F4E47BF-C800-49FE-85FB-10E0A96393C3}" dt="2024-04-30T19:32:41.307" v="1075" actId="1076"/>
+          <ac:spMkLst>
+            <pc:docMk/>
+            <pc:sldMk cId="3860791488" sldId="264"/>
+            <ac:spMk id="13" creationId="{9C686842-505D-96E5-ECDD-A86DC8CEF1F4}"/>
+          </ac:spMkLst>
+        </pc:spChg>
+        <pc:spChg chg="add del">
+          <ac:chgData name="MARTINEZ SALCEDO, JOSEPH" userId="4d2c8988-b1c0-4e9d-83be-da9944182c7d" providerId="ADAL" clId="{5F4E47BF-C800-49FE-85FB-10E0A96393C3}" dt="2024-04-30T15:02:53.888" v="395" actId="22"/>
+          <ac:spMkLst>
+            <pc:docMk/>
+            <pc:sldMk cId="3860791488" sldId="264"/>
+            <ac:spMk id="15" creationId="{4468BB29-4CB7-8932-EEFE-728DB34EDAC0}"/>
+          </ac:spMkLst>
+        </pc:spChg>
+        <pc:spChg chg="add mod">
+          <ac:chgData name="MARTINEZ SALCEDO, JOSEPH" userId="4d2c8988-b1c0-4e9d-83be-da9944182c7d" providerId="ADAL" clId="{5F4E47BF-C800-49FE-85FB-10E0A96393C3}" dt="2024-04-30T19:31:54.283" v="1060" actId="1076"/>
+          <ac:spMkLst>
+            <pc:docMk/>
+            <pc:sldMk cId="3860791488" sldId="264"/>
+            <ac:spMk id="16" creationId="{7BAE3D52-AB4F-8DE6-5FA8-B8070C03B7A7}"/>
+          </ac:spMkLst>
+        </pc:spChg>
+        <pc:spChg chg="add del mod">
+          <ac:chgData name="MARTINEZ SALCEDO, JOSEPH" userId="4d2c8988-b1c0-4e9d-83be-da9944182c7d" providerId="ADAL" clId="{5F4E47BF-C800-49FE-85FB-10E0A96393C3}" dt="2024-04-30T15:08:04.838" v="505" actId="478"/>
+          <ac:spMkLst>
+            <pc:docMk/>
+            <pc:sldMk cId="3860791488" sldId="264"/>
+            <ac:spMk id="17" creationId="{96B75A05-971F-BC61-4EB5-2FC95AA7E57C}"/>
+          </ac:spMkLst>
+        </pc:spChg>
+        <pc:spChg chg="add mod">
+          <ac:chgData name="MARTINEZ SALCEDO, JOSEPH" userId="4d2c8988-b1c0-4e9d-83be-da9944182c7d" providerId="ADAL" clId="{5F4E47BF-C800-49FE-85FB-10E0A96393C3}" dt="2024-04-30T15:22:38.418" v="733" actId="1076"/>
+          <ac:spMkLst>
+            <pc:docMk/>
+            <pc:sldMk cId="3860791488" sldId="264"/>
+            <ac:spMk id="19" creationId="{82463B85-2A13-13DF-A650-06C228A45D33}"/>
+          </ac:spMkLst>
+        </pc:spChg>
+        <pc:spChg chg="add mod">
+          <ac:chgData name="MARTINEZ SALCEDO, JOSEPH" userId="4d2c8988-b1c0-4e9d-83be-da9944182c7d" providerId="ADAL" clId="{5F4E47BF-C800-49FE-85FB-10E0A96393C3}" dt="2024-04-30T15:22:38.418" v="733" actId="1076"/>
+          <ac:spMkLst>
+            <pc:docMk/>
+            <pc:sldMk cId="3860791488" sldId="264"/>
+            <ac:spMk id="21" creationId="{8DDBE69A-A7BF-67EA-B1D5-F84CD0DF6505}"/>
+          </ac:spMkLst>
+        </pc:spChg>
+        <pc:spChg chg="add mod">
+          <ac:chgData name="MARTINEZ SALCEDO, JOSEPH" userId="4d2c8988-b1c0-4e9d-83be-da9944182c7d" providerId="ADAL" clId="{5F4E47BF-C800-49FE-85FB-10E0A96393C3}" dt="2024-04-30T15:22:38.418" v="733" actId="1076"/>
+          <ac:spMkLst>
+            <pc:docMk/>
+            <pc:sldMk cId="3860791488" sldId="264"/>
+            <ac:spMk id="22" creationId="{1DD1C25A-24BF-E83C-D827-1ECA77AC2B15}"/>
+          </ac:spMkLst>
+        </pc:spChg>
+        <pc:spChg chg="add mod">
+          <ac:chgData name="MARTINEZ SALCEDO, JOSEPH" userId="4d2c8988-b1c0-4e9d-83be-da9944182c7d" providerId="ADAL" clId="{5F4E47BF-C800-49FE-85FB-10E0A96393C3}" dt="2024-04-30T19:30:50.579" v="1053" actId="1076"/>
+          <ac:spMkLst>
+            <pc:docMk/>
+            <pc:sldMk cId="3860791488" sldId="264"/>
+            <ac:spMk id="24" creationId="{6107A477-238F-2B21-FE85-B065A8F9926C}"/>
+          </ac:spMkLst>
+        </pc:spChg>
+        <pc:spChg chg="add mod">
+          <ac:chgData name="MARTINEZ SALCEDO, JOSEPH" userId="4d2c8988-b1c0-4e9d-83be-da9944182c7d" providerId="ADAL" clId="{5F4E47BF-C800-49FE-85FB-10E0A96393C3}" dt="2024-04-30T19:30:31.394" v="1046" actId="14100"/>
+          <ac:spMkLst>
+            <pc:docMk/>
+            <pc:sldMk cId="3860791488" sldId="264"/>
+            <ac:spMk id="25" creationId="{71B1FECB-55C4-030E-7B24-D8E8A3919BDD}"/>
+          </ac:spMkLst>
+        </pc:spChg>
+        <pc:spChg chg="add mod">
+          <ac:chgData name="MARTINEZ SALCEDO, JOSEPH" userId="4d2c8988-b1c0-4e9d-83be-da9944182c7d" providerId="ADAL" clId="{5F4E47BF-C800-49FE-85FB-10E0A96393C3}" dt="2024-04-30T19:30:18.931" v="1043" actId="1076"/>
+          <ac:spMkLst>
+            <pc:docMk/>
+            <pc:sldMk cId="3860791488" sldId="264"/>
+            <ac:spMk id="26" creationId="{36576605-4086-D232-874E-C843023CBF12}"/>
+          </ac:spMkLst>
+        </pc:spChg>
+        <pc:spChg chg="add mod">
+          <ac:chgData name="MARTINEZ SALCEDO, JOSEPH" userId="4d2c8988-b1c0-4e9d-83be-da9944182c7d" providerId="ADAL" clId="{5F4E47BF-C800-49FE-85FB-10E0A96393C3}" dt="2024-04-30T19:30:42.067" v="1050" actId="1076"/>
+          <ac:spMkLst>
+            <pc:docMk/>
+            <pc:sldMk cId="3860791488" sldId="264"/>
+            <ac:spMk id="28" creationId="{399B26DD-A349-0DB3-63D3-A95CE57437F9}"/>
+          </ac:spMkLst>
+        </pc:spChg>
       </pc:sldChg>
     </pc:docChg>
   </pc:docChgLst>
@@ -17795,6 +18003,1049 @@
 <file path=ppt/slides/slide8.xml><?xml version="1.0" encoding="utf-8"?>
 <p:sld xmlns:a="http://schemas.openxmlformats.org/drawingml/2006/main" xmlns:r="http://schemas.openxmlformats.org/officeDocument/2006/relationships" xmlns:p="http://schemas.openxmlformats.org/presentationml/2006/main">
   <p:cSld>
+    <p:spTree>
+      <p:nvGrpSpPr>
+        <p:cNvPr id="1" name=""/>
+        <p:cNvGrpSpPr/>
+        <p:nvPr/>
+      </p:nvGrpSpPr>
+      <p:grpSpPr>
+        <a:xfrm>
+          <a:off x="0" y="0"/>
+          <a:ext cx="0" cy="0"/>
+          <a:chOff x="0" y="0"/>
+          <a:chExt cx="0" cy="0"/>
+        </a:xfrm>
+      </p:grpSpPr>
+      <p:sp>
+        <p:nvSpPr>
+          <p:cNvPr id="3" name="Rectangle: Rounded Corners 2">
+            <a:extLst>
+              <a:ext uri="{FF2B5EF4-FFF2-40B4-BE49-F238E27FC236}">
+                <a16:creationId xmlns:a16="http://schemas.microsoft.com/office/drawing/2014/main" id="{731AD656-B7B0-3989-3400-7BB299B75B2D}"/>
+              </a:ext>
+            </a:extLst>
+          </p:cNvPr>
+          <p:cNvSpPr/>
+          <p:nvPr/>
+        </p:nvSpPr>
+        <p:spPr>
+          <a:xfrm>
+            <a:off x="1164175" y="1607149"/>
+            <a:ext cx="5197549" cy="1899493"/>
+          </a:xfrm>
+          <a:prstGeom prst="roundRect">
+            <a:avLst>
+              <a:gd name="adj" fmla="val 50000"/>
+            </a:avLst>
+          </a:prstGeom>
+          <a:solidFill>
+            <a:srgbClr val="5B9BD5">
+              <a:alpha val="42000"/>
+            </a:srgbClr>
+          </a:solidFill>
+          <a:ln w="38100">
+            <a:noFill/>
+          </a:ln>
+        </p:spPr>
+        <p:style>
+          <a:lnRef idx="3">
+            <a:schemeClr val="lt1"/>
+          </a:lnRef>
+          <a:fillRef idx="1">
+            <a:schemeClr val="accent5"/>
+          </a:fillRef>
+          <a:effectRef idx="1">
+            <a:schemeClr val="accent5"/>
+          </a:effectRef>
+          <a:fontRef idx="minor">
+            <a:schemeClr val="lt1"/>
+          </a:fontRef>
+        </p:style>
+        <p:txBody>
+          <a:bodyPr rtlCol="0" anchor="t"/>
+          <a:lstStyle/>
+          <a:p>
+            <a:pPr algn="ctr"/>
+            <a:endParaRPr lang="en-US" b="1" dirty="0">
+              <a:solidFill>
+                <a:sysClr val="windowText" lastClr="000000"/>
+              </a:solidFill>
+              <a:latin typeface="Aptos" panose="020B0004020202020204" pitchFamily="34" charset="0"/>
+            </a:endParaRPr>
+          </a:p>
+        </p:txBody>
+      </p:sp>
+      <p:sp>
+        <p:nvSpPr>
+          <p:cNvPr id="5" name="Rectangle: Rounded Corners 4">
+            <a:extLst>
+              <a:ext uri="{FF2B5EF4-FFF2-40B4-BE49-F238E27FC236}">
+                <a16:creationId xmlns:a16="http://schemas.microsoft.com/office/drawing/2014/main" id="{88B23CA9-A1B3-E875-02FC-991517812786}"/>
+              </a:ext>
+            </a:extLst>
+          </p:cNvPr>
+          <p:cNvSpPr/>
+          <p:nvPr/>
+        </p:nvSpPr>
+        <p:spPr>
+          <a:xfrm>
+            <a:off x="203199" y="1607149"/>
+            <a:ext cx="2328623" cy="1892177"/>
+          </a:xfrm>
+          <a:prstGeom prst="roundRect">
+            <a:avLst>
+              <a:gd name="adj" fmla="val 50000"/>
+            </a:avLst>
+          </a:prstGeom>
+          <a:solidFill>
+            <a:schemeClr val="accent6">
+              <a:alpha val="42000"/>
+            </a:schemeClr>
+          </a:solidFill>
+          <a:ln w="38100">
+            <a:noFill/>
+          </a:ln>
+        </p:spPr>
+        <p:style>
+          <a:lnRef idx="3">
+            <a:schemeClr val="lt1"/>
+          </a:lnRef>
+          <a:fillRef idx="1">
+            <a:schemeClr val="accent5"/>
+          </a:fillRef>
+          <a:effectRef idx="1">
+            <a:schemeClr val="accent5"/>
+          </a:effectRef>
+          <a:fontRef idx="minor">
+            <a:schemeClr val="lt1"/>
+          </a:fontRef>
+        </p:style>
+        <p:txBody>
+          <a:bodyPr rtlCol="0" anchor="t"/>
+          <a:lstStyle/>
+          <a:p>
+            <a:endParaRPr lang="en-US" b="1" dirty="0">
+              <a:solidFill>
+                <a:sysClr val="windowText" lastClr="000000"/>
+              </a:solidFill>
+              <a:latin typeface="Aptos" panose="020B0004020202020204" pitchFamily="34" charset="0"/>
+            </a:endParaRPr>
+          </a:p>
+        </p:txBody>
+      </p:sp>
+      <p:sp>
+        <p:nvSpPr>
+          <p:cNvPr id="6" name="Rectangle: Rounded Corners 5">
+            <a:extLst>
+              <a:ext uri="{FF2B5EF4-FFF2-40B4-BE49-F238E27FC236}">
+                <a16:creationId xmlns:a16="http://schemas.microsoft.com/office/drawing/2014/main" id="{7F4474ED-DA02-6F86-758F-11D7A8BBAAF6}"/>
+              </a:ext>
+            </a:extLst>
+          </p:cNvPr>
+          <p:cNvSpPr/>
+          <p:nvPr/>
+        </p:nvSpPr>
+        <p:spPr>
+          <a:xfrm>
+            <a:off x="4124978" y="3551467"/>
+            <a:ext cx="3587842" cy="1243279"/>
+          </a:xfrm>
+          <a:prstGeom prst="roundRect">
+            <a:avLst>
+              <a:gd name="adj" fmla="val 50000"/>
+            </a:avLst>
+          </a:prstGeom>
+          <a:solidFill>
+            <a:schemeClr val="accent4">
+              <a:alpha val="42000"/>
+            </a:schemeClr>
+          </a:solidFill>
+          <a:ln w="38100">
+            <a:noFill/>
+          </a:ln>
+        </p:spPr>
+        <p:style>
+          <a:lnRef idx="3">
+            <a:schemeClr val="lt1"/>
+          </a:lnRef>
+          <a:fillRef idx="1">
+            <a:schemeClr val="accent5"/>
+          </a:fillRef>
+          <a:effectRef idx="1">
+            <a:schemeClr val="accent5"/>
+          </a:effectRef>
+          <a:fontRef idx="minor">
+            <a:schemeClr val="lt1"/>
+          </a:fontRef>
+        </p:style>
+        <p:txBody>
+          <a:bodyPr rtlCol="0" anchor="t"/>
+          <a:lstStyle/>
+          <a:p>
+            <a:pPr algn="r"/>
+            <a:endParaRPr lang="en-US" b="1" dirty="0">
+              <a:solidFill>
+                <a:sysClr val="windowText" lastClr="000000"/>
+              </a:solidFill>
+              <a:latin typeface="Aptos" panose="020B0004020202020204" pitchFamily="34" charset="0"/>
+            </a:endParaRPr>
+          </a:p>
+        </p:txBody>
+      </p:sp>
+      <p:sp>
+        <p:nvSpPr>
+          <p:cNvPr id="9" name="Rectangle 8">
+            <a:extLst>
+              <a:ext uri="{FF2B5EF4-FFF2-40B4-BE49-F238E27FC236}">
+                <a16:creationId xmlns:a16="http://schemas.microsoft.com/office/drawing/2014/main" id="{A76962F9-E2BD-6770-2F68-C6208D504AA4}"/>
+              </a:ext>
+            </a:extLst>
+          </p:cNvPr>
+          <p:cNvSpPr/>
+          <p:nvPr/>
+        </p:nvSpPr>
+        <p:spPr>
+          <a:xfrm>
+            <a:off x="2659056" y="1869017"/>
+            <a:ext cx="1567115" cy="830997"/>
+          </a:xfrm>
+          <a:prstGeom prst="rect">
+            <a:avLst/>
+          </a:prstGeom>
+          <a:noFill/>
+          <a:ln>
+            <a:noFill/>
+          </a:ln>
+        </p:spPr>
+        <p:style>
+          <a:lnRef idx="2">
+            <a:schemeClr val="accent1">
+              <a:shade val="15000"/>
+            </a:schemeClr>
+          </a:lnRef>
+          <a:fillRef idx="1">
+            <a:schemeClr val="accent1"/>
+          </a:fillRef>
+          <a:effectRef idx="0">
+            <a:schemeClr val="accent1"/>
+          </a:effectRef>
+          <a:fontRef idx="minor">
+            <a:schemeClr val="lt1"/>
+          </a:fontRef>
+        </p:style>
+        <p:txBody>
+          <a:bodyPr wrap="square" lIns="0" tIns="0" rIns="0" bIns="0" rtlCol="0" anchor="ctr">
+            <a:spAutoFit/>
+          </a:bodyPr>
+          <a:lstStyle/>
+          <a:p>
+            <a:pPr indent="-91440">
+              <a:buFont typeface="Symbol" panose="05050102010706020507" pitchFamily="18" charset="2"/>
+              <a:buChar char=""/>
+            </a:pPr>
+            <a:r>
+              <a:rPr lang="en-US" sz="1800" kern="0" dirty="0">
+                <a:solidFill>
+                  <a:schemeClr val="tx1"/>
+                </a:solidFill>
+                <a:effectLst/>
+                <a:latin typeface="Aptos" panose="020B0004020202020204" pitchFamily="34" charset="0"/>
+                <a:ea typeface="Times New Roman" panose="02020603050405020304" pitchFamily="18" charset="0"/>
+              </a:rPr>
+              <a:t>Social capital</a:t>
+            </a:r>
+          </a:p>
+          <a:p>
+            <a:pPr indent="-91440">
+              <a:buFont typeface="Symbol" panose="05050102010706020507" pitchFamily="18" charset="2"/>
+              <a:buChar char=""/>
+            </a:pPr>
+            <a:r>
+              <a:rPr lang="en-US" sz="1800" kern="0" dirty="0">
+                <a:solidFill>
+                  <a:schemeClr val="tx1"/>
+                </a:solidFill>
+                <a:effectLst/>
+                <a:latin typeface="Aptos" panose="020B0004020202020204" pitchFamily="34" charset="0"/>
+                <a:ea typeface="Times New Roman" panose="02020603050405020304" pitchFamily="18" charset="0"/>
+              </a:rPr>
+              <a:t>Cultural and social values</a:t>
+            </a:r>
+          </a:p>
+        </p:txBody>
+      </p:sp>
+      <p:sp>
+        <p:nvSpPr>
+          <p:cNvPr id="4" name="Rectangle: Rounded Corners 3">
+            <a:extLst>
+              <a:ext uri="{FF2B5EF4-FFF2-40B4-BE49-F238E27FC236}">
+                <a16:creationId xmlns:a16="http://schemas.microsoft.com/office/drawing/2014/main" id="{B470F236-1BAA-9B5C-FBE4-F397A4A24C73}"/>
+              </a:ext>
+            </a:extLst>
+          </p:cNvPr>
+          <p:cNvSpPr/>
+          <p:nvPr/>
+        </p:nvSpPr>
+        <p:spPr>
+          <a:xfrm>
+            <a:off x="4124978" y="1607149"/>
+            <a:ext cx="3502506" cy="1892177"/>
+          </a:xfrm>
+          <a:prstGeom prst="roundRect">
+            <a:avLst>
+              <a:gd name="adj" fmla="val 50000"/>
+            </a:avLst>
+          </a:prstGeom>
+          <a:solidFill>
+            <a:schemeClr val="accent2">
+              <a:alpha val="42000"/>
+            </a:schemeClr>
+          </a:solidFill>
+          <a:ln w="38100">
+            <a:noFill/>
+          </a:ln>
+        </p:spPr>
+        <p:style>
+          <a:lnRef idx="3">
+            <a:schemeClr val="lt1"/>
+          </a:lnRef>
+          <a:fillRef idx="1">
+            <a:schemeClr val="accent5"/>
+          </a:fillRef>
+          <a:effectRef idx="1">
+            <a:schemeClr val="accent5"/>
+          </a:effectRef>
+          <a:fontRef idx="minor">
+            <a:schemeClr val="lt1"/>
+          </a:fontRef>
+        </p:style>
+        <p:txBody>
+          <a:bodyPr rtlCol="0" anchor="t"/>
+          <a:lstStyle/>
+          <a:p>
+            <a:pPr algn="r"/>
+            <a:endParaRPr lang="en-US" b="1" dirty="0">
+              <a:solidFill>
+                <a:sysClr val="windowText" lastClr="000000"/>
+              </a:solidFill>
+              <a:latin typeface="Aptos" panose="020B0004020202020204" pitchFamily="34" charset="0"/>
+            </a:endParaRPr>
+          </a:p>
+        </p:txBody>
+      </p:sp>
+      <p:sp>
+        <p:nvSpPr>
+          <p:cNvPr id="12" name="Rectangle 11">
+            <a:extLst>
+              <a:ext uri="{FF2B5EF4-FFF2-40B4-BE49-F238E27FC236}">
+                <a16:creationId xmlns:a16="http://schemas.microsoft.com/office/drawing/2014/main" id="{2DAE8C09-D3C4-20D6-8688-5A574392747E}"/>
+              </a:ext>
+            </a:extLst>
+          </p:cNvPr>
+          <p:cNvSpPr/>
+          <p:nvPr/>
+        </p:nvSpPr>
+        <p:spPr>
+          <a:xfrm>
+            <a:off x="1158912" y="2276238"/>
+            <a:ext cx="1350717" cy="553998"/>
+          </a:xfrm>
+          <a:prstGeom prst="rect">
+            <a:avLst/>
+          </a:prstGeom>
+          <a:noFill/>
+          <a:ln>
+            <a:noFill/>
+          </a:ln>
+        </p:spPr>
+        <p:style>
+          <a:lnRef idx="2">
+            <a:schemeClr val="accent1">
+              <a:shade val="15000"/>
+            </a:schemeClr>
+          </a:lnRef>
+          <a:fillRef idx="1">
+            <a:schemeClr val="accent1"/>
+          </a:fillRef>
+          <a:effectRef idx="0">
+            <a:schemeClr val="accent1"/>
+          </a:effectRef>
+          <a:fontRef idx="minor">
+            <a:schemeClr val="lt1"/>
+          </a:fontRef>
+        </p:style>
+        <p:txBody>
+          <a:bodyPr wrap="square" lIns="0" tIns="0" rIns="0" bIns="0" rtlCol="0" anchor="ctr">
+            <a:spAutoFit/>
+          </a:bodyPr>
+          <a:lstStyle/>
+          <a:p>
+            <a:pPr indent="-91440" algn="ctr">
+              <a:buFont typeface="Symbol" panose="05050102010706020507" pitchFamily="18" charset="2"/>
+              <a:buChar char=""/>
+            </a:pPr>
+            <a:r>
+              <a:rPr lang="en-US" kern="0" dirty="0">
+                <a:solidFill>
+                  <a:schemeClr val="tx1"/>
+                </a:solidFill>
+                <a:latin typeface="Aptos" panose="020B0004020202020204" pitchFamily="34" charset="0"/>
+              </a:rPr>
+              <a:t>Economic capital</a:t>
+            </a:r>
+          </a:p>
+        </p:txBody>
+      </p:sp>
+      <p:sp>
+        <p:nvSpPr>
+          <p:cNvPr id="13" name="Rectangle 12">
+            <a:extLst>
+              <a:ext uri="{FF2B5EF4-FFF2-40B4-BE49-F238E27FC236}">
+                <a16:creationId xmlns:a16="http://schemas.microsoft.com/office/drawing/2014/main" id="{9C686842-505D-96E5-ECDD-A86DC8CEF1F4}"/>
+              </a:ext>
+            </a:extLst>
+          </p:cNvPr>
+          <p:cNvSpPr/>
+          <p:nvPr/>
+        </p:nvSpPr>
+        <p:spPr>
+          <a:xfrm>
+            <a:off x="4345512" y="1887555"/>
+            <a:ext cx="2039219" cy="830997"/>
+          </a:xfrm>
+          <a:prstGeom prst="rect">
+            <a:avLst/>
+          </a:prstGeom>
+          <a:noFill/>
+          <a:ln>
+            <a:noFill/>
+          </a:ln>
+        </p:spPr>
+        <p:style>
+          <a:lnRef idx="2">
+            <a:schemeClr val="accent1">
+              <a:shade val="15000"/>
+            </a:schemeClr>
+          </a:lnRef>
+          <a:fillRef idx="1">
+            <a:schemeClr val="accent1"/>
+          </a:fillRef>
+          <a:effectRef idx="0">
+            <a:schemeClr val="accent1"/>
+          </a:effectRef>
+          <a:fontRef idx="minor">
+            <a:schemeClr val="lt1"/>
+          </a:fontRef>
+        </p:style>
+        <p:txBody>
+          <a:bodyPr wrap="square" lIns="0" tIns="0" rIns="0" bIns="0" rtlCol="0" anchor="ctr">
+            <a:spAutoFit/>
+          </a:bodyPr>
+          <a:lstStyle/>
+          <a:p>
+            <a:pPr indent="-91440">
+              <a:buFont typeface="Symbol" panose="05050102010706020507" pitchFamily="18" charset="2"/>
+              <a:buChar char=""/>
+            </a:pPr>
+            <a:r>
+              <a:rPr lang="en-US" kern="0" dirty="0">
+                <a:solidFill>
+                  <a:schemeClr val="tx1"/>
+                </a:solidFill>
+                <a:latin typeface="Aptos" panose="020B0004020202020204" pitchFamily="34" charset="0"/>
+              </a:rPr>
+              <a:t>Quality of life</a:t>
+            </a:r>
+          </a:p>
+          <a:p>
+            <a:pPr indent="-91440">
+              <a:buFont typeface="Symbol" panose="05050102010706020507" pitchFamily="18" charset="2"/>
+              <a:buChar char=""/>
+            </a:pPr>
+            <a:r>
+              <a:rPr lang="en-US" kern="0" dirty="0">
+                <a:solidFill>
+                  <a:schemeClr val="tx1"/>
+                </a:solidFill>
+                <a:latin typeface="Aptos" panose="020B0004020202020204" pitchFamily="34" charset="0"/>
+              </a:rPr>
+              <a:t>Social polarization</a:t>
+            </a:r>
+          </a:p>
+          <a:p>
+            <a:pPr indent="-91440">
+              <a:buFont typeface="Symbol" panose="05050102010706020507" pitchFamily="18" charset="2"/>
+              <a:buChar char=""/>
+            </a:pPr>
+            <a:r>
+              <a:rPr lang="en-US" kern="0" dirty="0">
+                <a:solidFill>
+                  <a:schemeClr val="tx1"/>
+                </a:solidFill>
+                <a:latin typeface="Aptos" panose="020B0004020202020204" pitchFamily="34" charset="0"/>
+              </a:rPr>
+              <a:t>Trust in institutions</a:t>
+            </a:r>
+          </a:p>
+        </p:txBody>
+      </p:sp>
+      <p:sp>
+        <p:nvSpPr>
+          <p:cNvPr id="16" name="Rectangle 15">
+            <a:extLst>
+              <a:ext uri="{FF2B5EF4-FFF2-40B4-BE49-F238E27FC236}">
+                <a16:creationId xmlns:a16="http://schemas.microsoft.com/office/drawing/2014/main" id="{7BAE3D52-AB4F-8DE6-5FA8-B8070C03B7A7}"/>
+              </a:ext>
+            </a:extLst>
+          </p:cNvPr>
+          <p:cNvSpPr/>
+          <p:nvPr/>
+        </p:nvSpPr>
+        <p:spPr>
+          <a:xfrm>
+            <a:off x="6384731" y="2276238"/>
+            <a:ext cx="1165631" cy="553998"/>
+          </a:xfrm>
+          <a:prstGeom prst="rect">
+            <a:avLst/>
+          </a:prstGeom>
+          <a:noFill/>
+          <a:ln>
+            <a:noFill/>
+          </a:ln>
+        </p:spPr>
+        <p:style>
+          <a:lnRef idx="2">
+            <a:schemeClr val="accent1">
+              <a:shade val="15000"/>
+            </a:schemeClr>
+          </a:lnRef>
+          <a:fillRef idx="1">
+            <a:schemeClr val="accent1"/>
+          </a:fillRef>
+          <a:effectRef idx="0">
+            <a:schemeClr val="accent1"/>
+          </a:effectRef>
+          <a:fontRef idx="minor">
+            <a:schemeClr val="lt1"/>
+          </a:fontRef>
+        </p:style>
+        <p:txBody>
+          <a:bodyPr wrap="square" lIns="0" tIns="0" rIns="0" bIns="0" rtlCol="0" anchor="ctr">
+            <a:spAutoFit/>
+          </a:bodyPr>
+          <a:lstStyle/>
+          <a:p>
+            <a:pPr indent="-91440" algn="ctr">
+              <a:buFont typeface="Symbol" panose="05050102010706020507" pitchFamily="18" charset="2"/>
+              <a:buChar char=""/>
+            </a:pPr>
+            <a:r>
+              <a:rPr lang="en-US" kern="0" dirty="0">
+                <a:solidFill>
+                  <a:schemeClr val="tx1"/>
+                </a:solidFill>
+                <a:latin typeface="Aptos" panose="020B0004020202020204" pitchFamily="34" charset="0"/>
+              </a:rPr>
+              <a:t>Safety and security</a:t>
+            </a:r>
+          </a:p>
+        </p:txBody>
+      </p:sp>
+      <p:sp>
+        <p:nvSpPr>
+          <p:cNvPr id="19" name="TextBox 18">
+            <a:extLst>
+              <a:ext uri="{FF2B5EF4-FFF2-40B4-BE49-F238E27FC236}">
+                <a16:creationId xmlns:a16="http://schemas.microsoft.com/office/drawing/2014/main" id="{82463B85-2A13-13DF-A650-06C228A45D33}"/>
+              </a:ext>
+            </a:extLst>
+          </p:cNvPr>
+          <p:cNvSpPr txBox="1"/>
+          <p:nvPr/>
+        </p:nvSpPr>
+        <p:spPr>
+          <a:xfrm>
+            <a:off x="599091" y="1237814"/>
+            <a:ext cx="1536838" cy="369332"/>
+          </a:xfrm>
+          <a:prstGeom prst="rect">
+            <a:avLst/>
+          </a:prstGeom>
+          <a:noFill/>
+        </p:spPr>
+        <p:txBody>
+          <a:bodyPr wrap="square">
+            <a:spAutoFit/>
+          </a:bodyPr>
+          <a:lstStyle/>
+          <a:p>
+            <a:r>
+              <a:rPr lang="en-US" b="1" dirty="0">
+                <a:solidFill>
+                  <a:schemeClr val="accent6"/>
+                </a:solidFill>
+                <a:latin typeface="Aptos" panose="020B0004020202020204" pitchFamily="34" charset="0"/>
+              </a:rPr>
+              <a:t>economical</a:t>
+            </a:r>
+          </a:p>
+        </p:txBody>
+      </p:sp>
+      <p:sp>
+        <p:nvSpPr>
+          <p:cNvPr id="21" name="TextBox 20">
+            <a:extLst>
+              <a:ext uri="{FF2B5EF4-FFF2-40B4-BE49-F238E27FC236}">
+                <a16:creationId xmlns:a16="http://schemas.microsoft.com/office/drawing/2014/main" id="{8DDBE69A-A7BF-67EA-B1D5-F84CD0DF6505}"/>
+              </a:ext>
+            </a:extLst>
+          </p:cNvPr>
+          <p:cNvSpPr txBox="1"/>
+          <p:nvPr/>
+        </p:nvSpPr>
+        <p:spPr>
+          <a:xfrm>
+            <a:off x="2440267" y="1219513"/>
+            <a:ext cx="1911400" cy="369332"/>
+          </a:xfrm>
+          <a:prstGeom prst="rect">
+            <a:avLst/>
+          </a:prstGeom>
+          <a:noFill/>
+        </p:spPr>
+        <p:txBody>
+          <a:bodyPr wrap="square">
+            <a:spAutoFit/>
+          </a:bodyPr>
+          <a:lstStyle/>
+          <a:p>
+            <a:pPr algn="ctr"/>
+            <a:r>
+              <a:rPr lang="en-US" b="1" dirty="0">
+                <a:solidFill>
+                  <a:schemeClr val="accent5"/>
+                </a:solidFill>
+                <a:latin typeface="Aptos" panose="020B0004020202020204" pitchFamily="34" charset="0"/>
+              </a:rPr>
+              <a:t>social</a:t>
+            </a:r>
+          </a:p>
+        </p:txBody>
+      </p:sp>
+      <p:sp>
+        <p:nvSpPr>
+          <p:cNvPr id="22" name="TextBox 21">
+            <a:extLst>
+              <a:ext uri="{FF2B5EF4-FFF2-40B4-BE49-F238E27FC236}">
+                <a16:creationId xmlns:a16="http://schemas.microsoft.com/office/drawing/2014/main" id="{1DD1C25A-24BF-E83C-D827-1ECA77AC2B15}"/>
+              </a:ext>
+            </a:extLst>
+          </p:cNvPr>
+          <p:cNvSpPr txBox="1"/>
+          <p:nvPr/>
+        </p:nvSpPr>
+        <p:spPr>
+          <a:xfrm>
+            <a:off x="5028991" y="1228665"/>
+            <a:ext cx="1911400" cy="369332"/>
+          </a:xfrm>
+          <a:prstGeom prst="rect">
+            <a:avLst/>
+          </a:prstGeom>
+          <a:noFill/>
+        </p:spPr>
+        <p:txBody>
+          <a:bodyPr wrap="square">
+            <a:spAutoFit/>
+          </a:bodyPr>
+          <a:lstStyle/>
+          <a:p>
+            <a:pPr algn="ctr"/>
+            <a:r>
+              <a:rPr lang="en-US" b="1" dirty="0">
+                <a:solidFill>
+                  <a:schemeClr val="accent2"/>
+                </a:solidFill>
+                <a:latin typeface="Aptos" panose="020B0004020202020204" pitchFamily="34" charset="0"/>
+              </a:rPr>
+              <a:t>political</a:t>
+            </a:r>
+          </a:p>
+        </p:txBody>
+      </p:sp>
+      <p:sp>
+        <p:nvSpPr>
+          <p:cNvPr id="24" name="TextBox 23">
+            <a:extLst>
+              <a:ext uri="{FF2B5EF4-FFF2-40B4-BE49-F238E27FC236}">
+                <a16:creationId xmlns:a16="http://schemas.microsoft.com/office/drawing/2014/main" id="{6107A477-238F-2B21-FE85-B065A8F9926C}"/>
+              </a:ext>
+            </a:extLst>
+          </p:cNvPr>
+          <p:cNvSpPr txBox="1"/>
+          <p:nvPr/>
+        </p:nvSpPr>
+        <p:spPr>
+          <a:xfrm>
+            <a:off x="4844000" y="4794746"/>
+            <a:ext cx="2281382" cy="369332"/>
+          </a:xfrm>
+          <a:prstGeom prst="rect">
+            <a:avLst/>
+          </a:prstGeom>
+          <a:noFill/>
+        </p:spPr>
+        <p:txBody>
+          <a:bodyPr wrap="square">
+            <a:spAutoFit/>
+          </a:bodyPr>
+          <a:lstStyle/>
+          <a:p>
+            <a:pPr algn="ctr"/>
+            <a:r>
+              <a:rPr lang="en-US" b="1" dirty="0">
+                <a:solidFill>
+                  <a:schemeClr val="accent4"/>
+                </a:solidFill>
+                <a:latin typeface="Aptos" panose="020B0004020202020204" pitchFamily="34" charset="0"/>
+              </a:rPr>
+              <a:t>ecological</a:t>
+            </a:r>
+          </a:p>
+        </p:txBody>
+      </p:sp>
+      <p:sp>
+        <p:nvSpPr>
+          <p:cNvPr id="25" name="Rectangle: Rounded Corners 24">
+            <a:extLst>
+              <a:ext uri="{FF2B5EF4-FFF2-40B4-BE49-F238E27FC236}">
+                <a16:creationId xmlns:a16="http://schemas.microsoft.com/office/drawing/2014/main" id="{71B1FECB-55C4-030E-7B24-D8E8A3919BDD}"/>
+              </a:ext>
+            </a:extLst>
+          </p:cNvPr>
+          <p:cNvSpPr/>
+          <p:nvPr/>
+        </p:nvSpPr>
+        <p:spPr>
+          <a:xfrm>
+            <a:off x="2019300" y="2737090"/>
+            <a:ext cx="3810977" cy="1754491"/>
+          </a:xfrm>
+          <a:prstGeom prst="roundRect">
+            <a:avLst>
+              <a:gd name="adj" fmla="val 50000"/>
+            </a:avLst>
+          </a:prstGeom>
+          <a:solidFill>
+            <a:schemeClr val="bg1">
+              <a:lumMod val="50000"/>
+              <a:alpha val="42000"/>
+            </a:schemeClr>
+          </a:solidFill>
+          <a:ln w="38100">
+            <a:noFill/>
+          </a:ln>
+        </p:spPr>
+        <p:style>
+          <a:lnRef idx="3">
+            <a:schemeClr val="lt1"/>
+          </a:lnRef>
+          <a:fillRef idx="1">
+            <a:schemeClr val="accent5"/>
+          </a:fillRef>
+          <a:effectRef idx="1">
+            <a:schemeClr val="accent5"/>
+          </a:effectRef>
+          <a:fontRef idx="minor">
+            <a:schemeClr val="lt1"/>
+          </a:fontRef>
+        </p:style>
+        <p:txBody>
+          <a:bodyPr rtlCol="0" anchor="t"/>
+          <a:lstStyle/>
+          <a:p>
+            <a:pPr algn="r"/>
+            <a:endParaRPr lang="en-US" b="1" dirty="0">
+              <a:solidFill>
+                <a:schemeClr val="bg1">
+                  <a:lumMod val="50000"/>
+                </a:schemeClr>
+              </a:solidFill>
+              <a:latin typeface="Aptos" panose="020B0004020202020204" pitchFamily="34" charset="0"/>
+            </a:endParaRPr>
+          </a:p>
+        </p:txBody>
+      </p:sp>
+      <p:sp>
+        <p:nvSpPr>
+          <p:cNvPr id="26" name="TextBox 25">
+            <a:extLst>
+              <a:ext uri="{FF2B5EF4-FFF2-40B4-BE49-F238E27FC236}">
+                <a16:creationId xmlns:a16="http://schemas.microsoft.com/office/drawing/2014/main" id="{36576605-4086-D232-874E-C843023CBF12}"/>
+              </a:ext>
+            </a:extLst>
+          </p:cNvPr>
+          <p:cNvSpPr txBox="1"/>
+          <p:nvPr/>
+        </p:nvSpPr>
+        <p:spPr>
+          <a:xfrm>
+            <a:off x="2301922" y="4425414"/>
+            <a:ext cx="2281382" cy="369332"/>
+          </a:xfrm>
+          <a:prstGeom prst="rect">
+            <a:avLst/>
+          </a:prstGeom>
+          <a:noFill/>
+        </p:spPr>
+        <p:txBody>
+          <a:bodyPr wrap="square">
+            <a:spAutoFit/>
+          </a:bodyPr>
+          <a:lstStyle/>
+          <a:p>
+            <a:pPr algn="ctr"/>
+            <a:r>
+              <a:rPr lang="en-US" b="1" dirty="0">
+                <a:solidFill>
+                  <a:schemeClr val="bg1">
+                    <a:lumMod val="50000"/>
+                  </a:schemeClr>
+                </a:solidFill>
+                <a:latin typeface="Aptos" panose="020B0004020202020204" pitchFamily="34" charset="0"/>
+              </a:rPr>
+              <a:t>technological</a:t>
+            </a:r>
+          </a:p>
+        </p:txBody>
+      </p:sp>
+      <p:sp>
+        <p:nvSpPr>
+          <p:cNvPr id="28" name="TextBox 27">
+            <a:extLst>
+              <a:ext uri="{FF2B5EF4-FFF2-40B4-BE49-F238E27FC236}">
+                <a16:creationId xmlns:a16="http://schemas.microsoft.com/office/drawing/2014/main" id="{399B26DD-A349-0DB3-63D3-A95CE57437F9}"/>
+              </a:ext>
+            </a:extLst>
+          </p:cNvPr>
+          <p:cNvSpPr txBox="1"/>
+          <p:nvPr/>
+        </p:nvSpPr>
+        <p:spPr>
+          <a:xfrm>
+            <a:off x="5790793" y="3637825"/>
+            <a:ext cx="2281382" cy="1200329"/>
+          </a:xfrm>
+          <a:prstGeom prst="rect">
+            <a:avLst/>
+          </a:prstGeom>
+          <a:noFill/>
+        </p:spPr>
+        <p:txBody>
+          <a:bodyPr wrap="square">
+            <a:spAutoFit/>
+          </a:bodyPr>
+          <a:lstStyle/>
+          <a:p>
+            <a:pPr indent="-91440">
+              <a:buFont typeface="Symbol" panose="05050102010706020507" pitchFamily="18" charset="2"/>
+              <a:buChar char=""/>
+            </a:pPr>
+            <a:r>
+              <a:rPr lang="en-US" kern="0" dirty="0">
+                <a:solidFill>
+                  <a:schemeClr val="tx1"/>
+                </a:solidFill>
+                <a:latin typeface="Aptos" panose="020B0004020202020204" pitchFamily="34" charset="0"/>
+              </a:rPr>
+              <a:t>Environmental quality</a:t>
+            </a:r>
+          </a:p>
+          <a:p>
+            <a:pPr indent="-91440">
+              <a:buFont typeface="Symbol" panose="05050102010706020507" pitchFamily="18" charset="2"/>
+              <a:buChar char=""/>
+            </a:pPr>
+            <a:r>
+              <a:rPr lang="en-US" kern="0" dirty="0">
+                <a:latin typeface="Aptos" panose="020B0004020202020204" pitchFamily="34" charset="0"/>
+              </a:rPr>
+              <a:t>Environmental conservation</a:t>
+            </a:r>
+            <a:r>
+              <a:rPr lang="en-US" kern="0" dirty="0">
+                <a:solidFill>
+                  <a:schemeClr val="tx1"/>
+                </a:solidFill>
+                <a:latin typeface="Aptos" panose="020B0004020202020204" pitchFamily="34" charset="0"/>
+              </a:rPr>
+              <a:t> </a:t>
+            </a:r>
+          </a:p>
+        </p:txBody>
+      </p:sp>
+      <p:sp>
+        <p:nvSpPr>
+          <p:cNvPr id="2" name="TextBox 1">
+            <a:extLst>
+              <a:ext uri="{FF2B5EF4-FFF2-40B4-BE49-F238E27FC236}">
+                <a16:creationId xmlns:a16="http://schemas.microsoft.com/office/drawing/2014/main" id="{B499D3E3-37DC-0E5C-78DC-7DF28F1E951E}"/>
+              </a:ext>
+            </a:extLst>
+          </p:cNvPr>
+          <p:cNvSpPr txBox="1"/>
+          <p:nvPr/>
+        </p:nvSpPr>
+        <p:spPr>
+          <a:xfrm>
+            <a:off x="2466636" y="3511952"/>
+            <a:ext cx="1948806" cy="923330"/>
+          </a:xfrm>
+          <a:prstGeom prst="rect">
+            <a:avLst/>
+          </a:prstGeom>
+          <a:noFill/>
+        </p:spPr>
+        <p:txBody>
+          <a:bodyPr wrap="square">
+            <a:spAutoFit/>
+          </a:bodyPr>
+          <a:lstStyle/>
+          <a:p>
+            <a:pPr marL="91440" indent="-91440">
+              <a:buFont typeface="Symbol" panose="05050102010706020507" pitchFamily="18" charset="2"/>
+              <a:buChar char=""/>
+            </a:pPr>
+            <a:r>
+              <a:rPr lang="en-US" kern="0" dirty="0">
+                <a:latin typeface="Aptos" panose="020B0004020202020204" pitchFamily="34" charset="0"/>
+              </a:rPr>
+              <a:t>Energy sustainability </a:t>
+            </a:r>
+          </a:p>
+          <a:p>
+            <a:pPr marL="91440" indent="-91440">
+              <a:buFont typeface="Symbol" panose="05050102010706020507" pitchFamily="18" charset="2"/>
+              <a:buChar char=""/>
+            </a:pPr>
+            <a:r>
+              <a:rPr lang="en-US" kern="0" dirty="0">
+                <a:latin typeface="Aptos" panose="020B0004020202020204" pitchFamily="34" charset="0"/>
+              </a:rPr>
+              <a:t>Water security</a:t>
+            </a:r>
+          </a:p>
+        </p:txBody>
+      </p:sp>
+      <p:sp>
+        <p:nvSpPr>
+          <p:cNvPr id="7" name="TextBox 6">
+            <a:extLst>
+              <a:ext uri="{FF2B5EF4-FFF2-40B4-BE49-F238E27FC236}">
+                <a16:creationId xmlns:a16="http://schemas.microsoft.com/office/drawing/2014/main" id="{999A31C0-8D4C-B0A3-F4DE-91883D692739}"/>
+              </a:ext>
+            </a:extLst>
+          </p:cNvPr>
+          <p:cNvSpPr txBox="1"/>
+          <p:nvPr/>
+        </p:nvSpPr>
+        <p:spPr>
+          <a:xfrm>
+            <a:off x="4226171" y="3673667"/>
+            <a:ext cx="1463429" cy="646331"/>
+          </a:xfrm>
+          <a:prstGeom prst="rect">
+            <a:avLst/>
+          </a:prstGeom>
+          <a:noFill/>
+        </p:spPr>
+        <p:txBody>
+          <a:bodyPr wrap="square">
+            <a:spAutoFit/>
+          </a:bodyPr>
+          <a:lstStyle/>
+          <a:p>
+            <a:pPr marL="91440" indent="-91440">
+              <a:buFont typeface="Symbol" panose="05050102010706020507" pitchFamily="18" charset="2"/>
+              <a:buChar char=""/>
+            </a:pPr>
+            <a:r>
+              <a:rPr lang="en-US" kern="0" dirty="0">
+                <a:solidFill>
+                  <a:schemeClr val="tx1"/>
+                </a:solidFill>
+                <a:latin typeface="Aptos" panose="020B0004020202020204" pitchFamily="34" charset="0"/>
+              </a:rPr>
+              <a:t>Agricultural productivity</a:t>
+            </a:r>
+          </a:p>
+        </p:txBody>
+      </p:sp>
+      <p:sp>
+        <p:nvSpPr>
+          <p:cNvPr id="8" name="TextBox 7">
+            <a:extLst>
+              <a:ext uri="{FF2B5EF4-FFF2-40B4-BE49-F238E27FC236}">
+                <a16:creationId xmlns:a16="http://schemas.microsoft.com/office/drawing/2014/main" id="{1FEEA11E-76BF-BFFC-336E-179072560DEF}"/>
+              </a:ext>
+            </a:extLst>
+          </p:cNvPr>
+          <p:cNvSpPr txBox="1"/>
+          <p:nvPr/>
+        </p:nvSpPr>
+        <p:spPr>
+          <a:xfrm>
+            <a:off x="2584343" y="2782669"/>
+            <a:ext cx="1615348" cy="646331"/>
+          </a:xfrm>
+          <a:prstGeom prst="rect">
+            <a:avLst/>
+          </a:prstGeom>
+          <a:noFill/>
+        </p:spPr>
+        <p:txBody>
+          <a:bodyPr wrap="square">
+            <a:spAutoFit/>
+          </a:bodyPr>
+          <a:lstStyle/>
+          <a:p>
+            <a:pPr indent="-91440">
+              <a:buFont typeface="Symbol" panose="05050102010706020507" pitchFamily="18" charset="2"/>
+              <a:buChar char=""/>
+            </a:pPr>
+            <a:r>
+              <a:rPr lang="en-US" kern="0" dirty="0">
+                <a:solidFill>
+                  <a:schemeClr val="tx1"/>
+                </a:solidFill>
+                <a:latin typeface="Aptos" panose="020B0004020202020204" pitchFamily="34" charset="0"/>
+              </a:rPr>
+              <a:t>Urban-Rural Infrastructure</a:t>
+            </a:r>
+            <a:endParaRPr lang="en-US" kern="0" dirty="0">
+              <a:latin typeface="Aptos" panose="020B0004020202020204" pitchFamily="34" charset="0"/>
+            </a:endParaRPr>
+          </a:p>
+        </p:txBody>
+      </p:sp>
+    </p:spTree>
+    <p:extLst>
+      <p:ext uri="{BB962C8B-B14F-4D97-AF65-F5344CB8AC3E}">
+        <p14:creationId xmlns:p14="http://schemas.microsoft.com/office/powerpoint/2010/main" val="3860791488"/>
+      </p:ext>
+    </p:extLst>
+  </p:cSld>
+  <p:clrMapOvr>
+    <a:masterClrMapping/>
+  </p:clrMapOvr>
+</p:sld>
+</file>
+
+<file path=ppt/slides/slide9.xml><?xml version="1.0" encoding="utf-8"?>
+<p:sld xmlns:a="http://schemas.openxmlformats.org/drawingml/2006/main" xmlns:r="http://schemas.openxmlformats.org/officeDocument/2006/relationships" xmlns:p="http://schemas.openxmlformats.org/presentationml/2006/main">
+  <p:cSld>
     <p:bg>
       <p:bgPr>
         <a:solidFill>

</xml_diff>